<commit_message>
updated ppt with more details
</commit_message>
<xml_diff>
--- a/vcc-assignment-g23ai2014.pptx
+++ b/vcc-assignment-g23ai2014.pptx
@@ -5,7 +5,7 @@
     <p:sldMasterId id="2147483659" r:id="rId1"/>
   </p:sldMasterIdLst>
   <p:notesMasterIdLst>
-    <p:notesMasterId r:id="rId20"/>
+    <p:notesMasterId r:id="rId23"/>
   </p:notesMasterIdLst>
   <p:sldIdLst>
     <p:sldId id="256" r:id="rId2"/>
@@ -16,16 +16,19 @@
     <p:sldId id="261" r:id="rId7"/>
     <p:sldId id="262" r:id="rId8"/>
     <p:sldId id="263" r:id="rId9"/>
-    <p:sldId id="264" r:id="rId10"/>
-    <p:sldId id="265" r:id="rId11"/>
-    <p:sldId id="266" r:id="rId12"/>
-    <p:sldId id="267" r:id="rId13"/>
-    <p:sldId id="268" r:id="rId14"/>
-    <p:sldId id="269" r:id="rId15"/>
-    <p:sldId id="270" r:id="rId16"/>
-    <p:sldId id="271" r:id="rId17"/>
-    <p:sldId id="272" r:id="rId18"/>
-    <p:sldId id="273" r:id="rId19"/>
+    <p:sldId id="275" r:id="rId10"/>
+    <p:sldId id="276" r:id="rId11"/>
+    <p:sldId id="274" r:id="rId12"/>
+    <p:sldId id="264" r:id="rId13"/>
+    <p:sldId id="265" r:id="rId14"/>
+    <p:sldId id="266" r:id="rId15"/>
+    <p:sldId id="267" r:id="rId16"/>
+    <p:sldId id="268" r:id="rId17"/>
+    <p:sldId id="269" r:id="rId18"/>
+    <p:sldId id="270" r:id="rId19"/>
+    <p:sldId id="271" r:id="rId20"/>
+    <p:sldId id="272" r:id="rId21"/>
+    <p:sldId id="273" r:id="rId22"/>
   </p:sldIdLst>
   <p:sldSz cx="9144000" cy="5143500" type="screen16x9"/>
   <p:notesSz cx="6858000" cy="9144000"/>
@@ -827,6 +830,328 @@
   <p:cSld>
     <p:spTree>
       <p:nvGrpSpPr>
+        <p:cNvPr id="1" name="Shape 93"/>
+        <p:cNvGrpSpPr/>
+        <p:nvPr/>
+      </p:nvGrpSpPr>
+      <p:grpSpPr>
+        <a:xfrm>
+          <a:off x="0" y="0"/>
+          <a:ext cx="0" cy="0"/>
+          <a:chOff x="0" y="0"/>
+          <a:chExt cx="0" cy="0"/>
+        </a:xfrm>
+      </p:grpSpPr>
+      <p:sp>
+        <p:nvSpPr>
+          <p:cNvPr id="94" name="Google Shape;94;g2f853ba87ba_0_203:notes"/>
+          <p:cNvSpPr>
+            <a:spLocks noGrp="1" noRot="1" noChangeAspect="1"/>
+          </p:cNvSpPr>
+          <p:nvPr>
+            <p:ph type="sldImg" idx="2"/>
+          </p:nvPr>
+        </p:nvSpPr>
+        <p:spPr>
+          <a:xfrm>
+            <a:off x="381000" y="685800"/>
+            <a:ext cx="6096000" cy="3429000"/>
+          </a:xfrm>
+          <a:custGeom>
+            <a:avLst/>
+            <a:gdLst/>
+            <a:ahLst/>
+            <a:cxnLst/>
+            <a:rect l="l" t="t" r="r" b="b"/>
+            <a:pathLst>
+              <a:path w="120000" h="120000" extrusionOk="0">
+                <a:moveTo>
+                  <a:pt x="0" y="0"/>
+                </a:moveTo>
+                <a:lnTo>
+                  <a:pt x="120000" y="0"/>
+                </a:lnTo>
+                <a:lnTo>
+                  <a:pt x="120000" y="120000"/>
+                </a:lnTo>
+                <a:lnTo>
+                  <a:pt x="0" y="120000"/>
+                </a:lnTo>
+                <a:close/>
+              </a:path>
+            </a:pathLst>
+          </a:custGeom>
+        </p:spPr>
+      </p:sp>
+      <p:sp>
+        <p:nvSpPr>
+          <p:cNvPr id="95" name="Google Shape;95;g2f853ba87ba_0_203:notes"/>
+          <p:cNvSpPr txBox="1">
+            <a:spLocks noGrp="1"/>
+          </p:cNvSpPr>
+          <p:nvPr>
+            <p:ph type="body" idx="1"/>
+          </p:nvPr>
+        </p:nvSpPr>
+        <p:spPr>
+          <a:xfrm>
+            <a:off x="685800" y="4343400"/>
+            <a:ext cx="5486400" cy="4114800"/>
+          </a:xfrm>
+          <a:prstGeom prst="rect">
+            <a:avLst/>
+          </a:prstGeom>
+        </p:spPr>
+        <p:txBody>
+          <a:bodyPr spcFirstLastPara="1" wrap="square" lIns="91425" tIns="91425" rIns="91425" bIns="91425" anchor="t" anchorCtr="0">
+            <a:noAutofit/>
+          </a:bodyPr>
+          <a:lstStyle/>
+          <a:p>
+            <a:pPr marL="0" lvl="0" indent="0" algn="l" rtl="0">
+              <a:spcBef>
+                <a:spcPts val="0"/>
+              </a:spcBef>
+              <a:spcAft>
+                <a:spcPts val="0"/>
+              </a:spcAft>
+              <a:buNone/>
+            </a:pPr>
+            <a:endParaRPr/>
+          </a:p>
+        </p:txBody>
+      </p:sp>
+    </p:spTree>
+    <p:extLst>
+      <p:ext uri="{BB962C8B-B14F-4D97-AF65-F5344CB8AC3E}">
+        <p14:creationId xmlns:p14="http://schemas.microsoft.com/office/powerpoint/2010/main" val="2290843113"/>
+      </p:ext>
+    </p:extLst>
+  </p:cSld>
+  <p:clrMapOvr>
+    <a:masterClrMapping/>
+  </p:clrMapOvr>
+</p:notes>
+</file>
+
+<file path=ppt/notesSlides/notesSlide11.xml><?xml version="1.0" encoding="utf-8"?>
+<p:notes xmlns:a="http://schemas.openxmlformats.org/drawingml/2006/main" xmlns:r="http://schemas.openxmlformats.org/officeDocument/2006/relationships" xmlns:p="http://schemas.openxmlformats.org/presentationml/2006/main" showMasterSp="0" showMasterPhAnim="0">
+  <p:cSld>
+    <p:spTree>
+      <p:nvGrpSpPr>
+        <p:cNvPr id="1" name="Shape 93"/>
+        <p:cNvGrpSpPr/>
+        <p:nvPr/>
+      </p:nvGrpSpPr>
+      <p:grpSpPr>
+        <a:xfrm>
+          <a:off x="0" y="0"/>
+          <a:ext cx="0" cy="0"/>
+          <a:chOff x="0" y="0"/>
+          <a:chExt cx="0" cy="0"/>
+        </a:xfrm>
+      </p:grpSpPr>
+      <p:sp>
+        <p:nvSpPr>
+          <p:cNvPr id="94" name="Google Shape;94;g2f853ba87ba_0_203:notes"/>
+          <p:cNvSpPr>
+            <a:spLocks noGrp="1" noRot="1" noChangeAspect="1"/>
+          </p:cNvSpPr>
+          <p:nvPr>
+            <p:ph type="sldImg" idx="2"/>
+          </p:nvPr>
+        </p:nvSpPr>
+        <p:spPr>
+          <a:xfrm>
+            <a:off x="381000" y="685800"/>
+            <a:ext cx="6096000" cy="3429000"/>
+          </a:xfrm>
+          <a:custGeom>
+            <a:avLst/>
+            <a:gdLst/>
+            <a:ahLst/>
+            <a:cxnLst/>
+            <a:rect l="l" t="t" r="r" b="b"/>
+            <a:pathLst>
+              <a:path w="120000" h="120000" extrusionOk="0">
+                <a:moveTo>
+                  <a:pt x="0" y="0"/>
+                </a:moveTo>
+                <a:lnTo>
+                  <a:pt x="120000" y="0"/>
+                </a:lnTo>
+                <a:lnTo>
+                  <a:pt x="120000" y="120000"/>
+                </a:lnTo>
+                <a:lnTo>
+                  <a:pt x="0" y="120000"/>
+                </a:lnTo>
+                <a:close/>
+              </a:path>
+            </a:pathLst>
+          </a:custGeom>
+        </p:spPr>
+      </p:sp>
+      <p:sp>
+        <p:nvSpPr>
+          <p:cNvPr id="95" name="Google Shape;95;g2f853ba87ba_0_203:notes"/>
+          <p:cNvSpPr txBox="1">
+            <a:spLocks noGrp="1"/>
+          </p:cNvSpPr>
+          <p:nvPr>
+            <p:ph type="body" idx="1"/>
+          </p:nvPr>
+        </p:nvSpPr>
+        <p:spPr>
+          <a:xfrm>
+            <a:off x="685800" y="4343400"/>
+            <a:ext cx="5486400" cy="4114800"/>
+          </a:xfrm>
+          <a:prstGeom prst="rect">
+            <a:avLst/>
+          </a:prstGeom>
+        </p:spPr>
+        <p:txBody>
+          <a:bodyPr spcFirstLastPara="1" wrap="square" lIns="91425" tIns="91425" rIns="91425" bIns="91425" anchor="t" anchorCtr="0">
+            <a:noAutofit/>
+          </a:bodyPr>
+          <a:lstStyle/>
+          <a:p>
+            <a:pPr marL="0" lvl="0" indent="0" algn="l" rtl="0">
+              <a:spcBef>
+                <a:spcPts val="0"/>
+              </a:spcBef>
+              <a:spcAft>
+                <a:spcPts val="0"/>
+              </a:spcAft>
+              <a:buNone/>
+            </a:pPr>
+            <a:endParaRPr/>
+          </a:p>
+        </p:txBody>
+      </p:sp>
+    </p:spTree>
+    <p:extLst>
+      <p:ext uri="{BB962C8B-B14F-4D97-AF65-F5344CB8AC3E}">
+        <p14:creationId xmlns:p14="http://schemas.microsoft.com/office/powerpoint/2010/main" val="4132221479"/>
+      </p:ext>
+    </p:extLst>
+  </p:cSld>
+  <p:clrMapOvr>
+    <a:masterClrMapping/>
+  </p:clrMapOvr>
+</p:notes>
+</file>
+
+<file path=ppt/notesSlides/notesSlide12.xml><?xml version="1.0" encoding="utf-8"?>
+<p:notes xmlns:a="http://schemas.openxmlformats.org/drawingml/2006/main" xmlns:r="http://schemas.openxmlformats.org/officeDocument/2006/relationships" xmlns:p="http://schemas.openxmlformats.org/presentationml/2006/main" showMasterSp="0" showMasterPhAnim="0">
+  <p:cSld>
+    <p:spTree>
+      <p:nvGrpSpPr>
+        <p:cNvPr id="1" name="Shape 100"/>
+        <p:cNvGrpSpPr/>
+        <p:nvPr/>
+      </p:nvGrpSpPr>
+      <p:grpSpPr>
+        <a:xfrm>
+          <a:off x="0" y="0"/>
+          <a:ext cx="0" cy="0"/>
+          <a:chOff x="0" y="0"/>
+          <a:chExt cx="0" cy="0"/>
+        </a:xfrm>
+      </p:grpSpPr>
+      <p:sp>
+        <p:nvSpPr>
+          <p:cNvPr id="101" name="Google Shape;101;g2f855a959a3_0_3:notes"/>
+          <p:cNvSpPr>
+            <a:spLocks noGrp="1" noRot="1" noChangeAspect="1"/>
+          </p:cNvSpPr>
+          <p:nvPr>
+            <p:ph type="sldImg" idx="2"/>
+          </p:nvPr>
+        </p:nvSpPr>
+        <p:spPr>
+          <a:xfrm>
+            <a:off x="381000" y="685800"/>
+            <a:ext cx="6096000" cy="3429000"/>
+          </a:xfrm>
+          <a:custGeom>
+            <a:avLst/>
+            <a:gdLst/>
+            <a:ahLst/>
+            <a:cxnLst/>
+            <a:rect l="l" t="t" r="r" b="b"/>
+            <a:pathLst>
+              <a:path w="120000" h="120000" extrusionOk="0">
+                <a:moveTo>
+                  <a:pt x="0" y="0"/>
+                </a:moveTo>
+                <a:lnTo>
+                  <a:pt x="120000" y="0"/>
+                </a:lnTo>
+                <a:lnTo>
+                  <a:pt x="120000" y="120000"/>
+                </a:lnTo>
+                <a:lnTo>
+                  <a:pt x="0" y="120000"/>
+                </a:lnTo>
+                <a:close/>
+              </a:path>
+            </a:pathLst>
+          </a:custGeom>
+        </p:spPr>
+      </p:sp>
+      <p:sp>
+        <p:nvSpPr>
+          <p:cNvPr id="102" name="Google Shape;102;g2f855a959a3_0_3:notes"/>
+          <p:cNvSpPr txBox="1">
+            <a:spLocks noGrp="1"/>
+          </p:cNvSpPr>
+          <p:nvPr>
+            <p:ph type="body" idx="1"/>
+          </p:nvPr>
+        </p:nvSpPr>
+        <p:spPr>
+          <a:xfrm>
+            <a:off x="685800" y="4343400"/>
+            <a:ext cx="5486400" cy="4114800"/>
+          </a:xfrm>
+          <a:prstGeom prst="rect">
+            <a:avLst/>
+          </a:prstGeom>
+        </p:spPr>
+        <p:txBody>
+          <a:bodyPr spcFirstLastPara="1" wrap="square" lIns="91425" tIns="91425" rIns="91425" bIns="91425" anchor="t" anchorCtr="0">
+            <a:noAutofit/>
+          </a:bodyPr>
+          <a:lstStyle/>
+          <a:p>
+            <a:pPr marL="0" lvl="0" indent="0" algn="l" rtl="0">
+              <a:spcBef>
+                <a:spcPts val="0"/>
+              </a:spcBef>
+              <a:spcAft>
+                <a:spcPts val="0"/>
+              </a:spcAft>
+              <a:buNone/>
+            </a:pPr>
+            <a:endParaRPr/>
+          </a:p>
+        </p:txBody>
+      </p:sp>
+    </p:spTree>
+  </p:cSld>
+  <p:clrMapOvr>
+    <a:masterClrMapping/>
+  </p:clrMapOvr>
+</p:notes>
+</file>
+
+<file path=ppt/notesSlides/notesSlide13.xml><?xml version="1.0" encoding="utf-8"?>
+<p:notes xmlns:a="http://schemas.openxmlformats.org/drawingml/2006/main" xmlns:r="http://schemas.openxmlformats.org/officeDocument/2006/relationships" xmlns:p="http://schemas.openxmlformats.org/presentationml/2006/main" showMasterSp="0" showMasterPhAnim="0">
+  <p:cSld>
+    <p:spTree>
+      <p:nvGrpSpPr>
         <p:cNvPr id="1" name="Shape 106"/>
         <p:cNvGrpSpPr/>
         <p:nvPr/>
@@ -926,7 +1251,7 @@
 </p:notes>
 </file>
 
-<file path=ppt/notesSlides/notesSlide11.xml><?xml version="1.0" encoding="utf-8"?>
+<file path=ppt/notesSlides/notesSlide14.xml><?xml version="1.0" encoding="utf-8"?>
 <p:notes xmlns:a="http://schemas.openxmlformats.org/drawingml/2006/main" xmlns:r="http://schemas.openxmlformats.org/officeDocument/2006/relationships" xmlns:p="http://schemas.openxmlformats.org/presentationml/2006/main" showMasterSp="0" showMasterPhAnim="0">
   <p:cSld>
     <p:spTree>
@@ -1030,7 +1355,7 @@
 </p:notes>
 </file>
 
-<file path=ppt/notesSlides/notesSlide12.xml><?xml version="1.0" encoding="utf-8"?>
+<file path=ppt/notesSlides/notesSlide15.xml><?xml version="1.0" encoding="utf-8"?>
 <p:notes xmlns:a="http://schemas.openxmlformats.org/drawingml/2006/main" xmlns:r="http://schemas.openxmlformats.org/officeDocument/2006/relationships" xmlns:p="http://schemas.openxmlformats.org/presentationml/2006/main" showMasterSp="0" showMasterPhAnim="0">
   <p:cSld>
     <p:spTree>
@@ -1134,7 +1459,7 @@
 </p:notes>
 </file>
 
-<file path=ppt/notesSlides/notesSlide13.xml><?xml version="1.0" encoding="utf-8"?>
+<file path=ppt/notesSlides/notesSlide16.xml><?xml version="1.0" encoding="utf-8"?>
 <p:notes xmlns:a="http://schemas.openxmlformats.org/drawingml/2006/main" xmlns:r="http://schemas.openxmlformats.org/officeDocument/2006/relationships" xmlns:p="http://schemas.openxmlformats.org/presentationml/2006/main" showMasterSp="0" showMasterPhAnim="0">
   <p:cSld>
     <p:spTree>
@@ -1238,7 +1563,7 @@
 </p:notes>
 </file>
 
-<file path=ppt/notesSlides/notesSlide14.xml><?xml version="1.0" encoding="utf-8"?>
+<file path=ppt/notesSlides/notesSlide17.xml><?xml version="1.0" encoding="utf-8"?>
 <p:notes xmlns:a="http://schemas.openxmlformats.org/drawingml/2006/main" xmlns:r="http://schemas.openxmlformats.org/officeDocument/2006/relationships" xmlns:p="http://schemas.openxmlformats.org/presentationml/2006/main" showMasterSp="0" showMasterPhAnim="0">
   <p:cSld>
     <p:spTree>
@@ -1342,7 +1667,7 @@
 </p:notes>
 </file>
 
-<file path=ppt/notesSlides/notesSlide15.xml><?xml version="1.0" encoding="utf-8"?>
+<file path=ppt/notesSlides/notesSlide18.xml><?xml version="1.0" encoding="utf-8"?>
 <p:notes xmlns:a="http://schemas.openxmlformats.org/drawingml/2006/main" xmlns:r="http://schemas.openxmlformats.org/officeDocument/2006/relationships" xmlns:p="http://schemas.openxmlformats.org/presentationml/2006/main" showMasterSp="0" showMasterPhAnim="0">
   <p:cSld>
     <p:spTree>
@@ -1446,7 +1771,7 @@
 </p:notes>
 </file>
 
-<file path=ppt/notesSlides/notesSlide16.xml><?xml version="1.0" encoding="utf-8"?>
+<file path=ppt/notesSlides/notesSlide19.xml><?xml version="1.0" encoding="utf-8"?>
 <p:notes xmlns:a="http://schemas.openxmlformats.org/drawingml/2006/main" xmlns:r="http://schemas.openxmlformats.org/officeDocument/2006/relationships" xmlns:p="http://schemas.openxmlformats.org/presentationml/2006/main" showMasterSp="0" showMasterPhAnim="0">
   <p:cSld>
     <p:spTree>
@@ -1507,214 +1832,6 @@
       <p:sp>
         <p:nvSpPr>
           <p:cNvPr id="144" name="Google Shape;144;g2f853ba87ba_0_244:notes"/>
-          <p:cNvSpPr txBox="1">
-            <a:spLocks noGrp="1"/>
-          </p:cNvSpPr>
-          <p:nvPr>
-            <p:ph type="body" idx="1"/>
-          </p:nvPr>
-        </p:nvSpPr>
-        <p:spPr>
-          <a:xfrm>
-            <a:off x="685800" y="4343400"/>
-            <a:ext cx="5486400" cy="4114800"/>
-          </a:xfrm>
-          <a:prstGeom prst="rect">
-            <a:avLst/>
-          </a:prstGeom>
-        </p:spPr>
-        <p:txBody>
-          <a:bodyPr spcFirstLastPara="1" wrap="square" lIns="91425" tIns="91425" rIns="91425" bIns="91425" anchor="t" anchorCtr="0">
-            <a:noAutofit/>
-          </a:bodyPr>
-          <a:lstStyle/>
-          <a:p>
-            <a:pPr marL="0" lvl="0" indent="0" algn="l" rtl="0">
-              <a:spcBef>
-                <a:spcPts val="0"/>
-              </a:spcBef>
-              <a:spcAft>
-                <a:spcPts val="0"/>
-              </a:spcAft>
-              <a:buNone/>
-            </a:pPr>
-            <a:endParaRPr/>
-          </a:p>
-        </p:txBody>
-      </p:sp>
-    </p:spTree>
-  </p:cSld>
-  <p:clrMapOvr>
-    <a:masterClrMapping/>
-  </p:clrMapOvr>
-</p:notes>
-</file>
-
-<file path=ppt/notesSlides/notesSlide17.xml><?xml version="1.0" encoding="utf-8"?>
-<p:notes xmlns:a="http://schemas.openxmlformats.org/drawingml/2006/main" xmlns:r="http://schemas.openxmlformats.org/officeDocument/2006/relationships" xmlns:p="http://schemas.openxmlformats.org/presentationml/2006/main" showMasterSp="0" showMasterPhAnim="0">
-  <p:cSld>
-    <p:spTree>
-      <p:nvGrpSpPr>
-        <p:cNvPr id="1" name="Shape 148"/>
-        <p:cNvGrpSpPr/>
-        <p:nvPr/>
-      </p:nvGrpSpPr>
-      <p:grpSpPr>
-        <a:xfrm>
-          <a:off x="0" y="0"/>
-          <a:ext cx="0" cy="0"/>
-          <a:chOff x="0" y="0"/>
-          <a:chExt cx="0" cy="0"/>
-        </a:xfrm>
-      </p:grpSpPr>
-      <p:sp>
-        <p:nvSpPr>
-          <p:cNvPr id="149" name="Google Shape;149;g2f853ba87ba_0_250:notes"/>
-          <p:cNvSpPr>
-            <a:spLocks noGrp="1" noRot="1" noChangeAspect="1"/>
-          </p:cNvSpPr>
-          <p:nvPr>
-            <p:ph type="sldImg" idx="2"/>
-          </p:nvPr>
-        </p:nvSpPr>
-        <p:spPr>
-          <a:xfrm>
-            <a:off x="381000" y="685800"/>
-            <a:ext cx="6096000" cy="3429000"/>
-          </a:xfrm>
-          <a:custGeom>
-            <a:avLst/>
-            <a:gdLst/>
-            <a:ahLst/>
-            <a:cxnLst/>
-            <a:rect l="l" t="t" r="r" b="b"/>
-            <a:pathLst>
-              <a:path w="120000" h="120000" extrusionOk="0">
-                <a:moveTo>
-                  <a:pt x="0" y="0"/>
-                </a:moveTo>
-                <a:lnTo>
-                  <a:pt x="120000" y="0"/>
-                </a:lnTo>
-                <a:lnTo>
-                  <a:pt x="120000" y="120000"/>
-                </a:lnTo>
-                <a:lnTo>
-                  <a:pt x="0" y="120000"/>
-                </a:lnTo>
-                <a:close/>
-              </a:path>
-            </a:pathLst>
-          </a:custGeom>
-        </p:spPr>
-      </p:sp>
-      <p:sp>
-        <p:nvSpPr>
-          <p:cNvPr id="150" name="Google Shape;150;g2f853ba87ba_0_250:notes"/>
-          <p:cNvSpPr txBox="1">
-            <a:spLocks noGrp="1"/>
-          </p:cNvSpPr>
-          <p:nvPr>
-            <p:ph type="body" idx="1"/>
-          </p:nvPr>
-        </p:nvSpPr>
-        <p:spPr>
-          <a:xfrm>
-            <a:off x="685800" y="4343400"/>
-            <a:ext cx="5486400" cy="4114800"/>
-          </a:xfrm>
-          <a:prstGeom prst="rect">
-            <a:avLst/>
-          </a:prstGeom>
-        </p:spPr>
-        <p:txBody>
-          <a:bodyPr spcFirstLastPara="1" wrap="square" lIns="91425" tIns="91425" rIns="91425" bIns="91425" anchor="t" anchorCtr="0">
-            <a:noAutofit/>
-          </a:bodyPr>
-          <a:lstStyle/>
-          <a:p>
-            <a:pPr marL="0" lvl="0" indent="0" algn="l" rtl="0">
-              <a:spcBef>
-                <a:spcPts val="0"/>
-              </a:spcBef>
-              <a:spcAft>
-                <a:spcPts val="0"/>
-              </a:spcAft>
-              <a:buNone/>
-            </a:pPr>
-            <a:endParaRPr/>
-          </a:p>
-        </p:txBody>
-      </p:sp>
-    </p:spTree>
-  </p:cSld>
-  <p:clrMapOvr>
-    <a:masterClrMapping/>
-  </p:clrMapOvr>
-</p:notes>
-</file>
-
-<file path=ppt/notesSlides/notesSlide18.xml><?xml version="1.0" encoding="utf-8"?>
-<p:notes xmlns:a="http://schemas.openxmlformats.org/drawingml/2006/main" xmlns:r="http://schemas.openxmlformats.org/officeDocument/2006/relationships" xmlns:p="http://schemas.openxmlformats.org/presentationml/2006/main" showMasterSp="0" showMasterPhAnim="0">
-  <p:cSld>
-    <p:spTree>
-      <p:nvGrpSpPr>
-        <p:cNvPr id="1" name="Shape 154"/>
-        <p:cNvGrpSpPr/>
-        <p:nvPr/>
-      </p:nvGrpSpPr>
-      <p:grpSpPr>
-        <a:xfrm>
-          <a:off x="0" y="0"/>
-          <a:ext cx="0" cy="0"/>
-          <a:chOff x="0" y="0"/>
-          <a:chExt cx="0" cy="0"/>
-        </a:xfrm>
-      </p:grpSpPr>
-      <p:sp>
-        <p:nvSpPr>
-          <p:cNvPr id="155" name="Google Shape;155;g2f853ba87ba_0_265:notes"/>
-          <p:cNvSpPr>
-            <a:spLocks noGrp="1" noRot="1" noChangeAspect="1"/>
-          </p:cNvSpPr>
-          <p:nvPr>
-            <p:ph type="sldImg" idx="2"/>
-          </p:nvPr>
-        </p:nvSpPr>
-        <p:spPr>
-          <a:xfrm>
-            <a:off x="381000" y="685800"/>
-            <a:ext cx="6096000" cy="3429000"/>
-          </a:xfrm>
-          <a:custGeom>
-            <a:avLst/>
-            <a:gdLst/>
-            <a:ahLst/>
-            <a:cxnLst/>
-            <a:rect l="l" t="t" r="r" b="b"/>
-            <a:pathLst>
-              <a:path w="120000" h="120000" extrusionOk="0">
-                <a:moveTo>
-                  <a:pt x="0" y="0"/>
-                </a:moveTo>
-                <a:lnTo>
-                  <a:pt x="120000" y="0"/>
-                </a:lnTo>
-                <a:lnTo>
-                  <a:pt x="120000" y="120000"/>
-                </a:lnTo>
-                <a:lnTo>
-                  <a:pt x="0" y="120000"/>
-                </a:lnTo>
-                <a:close/>
-              </a:path>
-            </a:pathLst>
-          </a:custGeom>
-        </p:spPr>
-      </p:sp>
-      <p:sp>
-        <p:nvSpPr>
-          <p:cNvPr id="156" name="Google Shape;156;g2f853ba87ba_0_265:notes"/>
           <p:cNvSpPr txBox="1">
             <a:spLocks noGrp="1"/>
           </p:cNvSpPr>
@@ -1862,6 +1979,214 @@
 </p:notes>
 </file>
 
+<file path=ppt/notesSlides/notesSlide20.xml><?xml version="1.0" encoding="utf-8"?>
+<p:notes xmlns:a="http://schemas.openxmlformats.org/drawingml/2006/main" xmlns:r="http://schemas.openxmlformats.org/officeDocument/2006/relationships" xmlns:p="http://schemas.openxmlformats.org/presentationml/2006/main" showMasterSp="0" showMasterPhAnim="0">
+  <p:cSld>
+    <p:spTree>
+      <p:nvGrpSpPr>
+        <p:cNvPr id="1" name="Shape 148"/>
+        <p:cNvGrpSpPr/>
+        <p:nvPr/>
+      </p:nvGrpSpPr>
+      <p:grpSpPr>
+        <a:xfrm>
+          <a:off x="0" y="0"/>
+          <a:ext cx="0" cy="0"/>
+          <a:chOff x="0" y="0"/>
+          <a:chExt cx="0" cy="0"/>
+        </a:xfrm>
+      </p:grpSpPr>
+      <p:sp>
+        <p:nvSpPr>
+          <p:cNvPr id="149" name="Google Shape;149;g2f853ba87ba_0_250:notes"/>
+          <p:cNvSpPr>
+            <a:spLocks noGrp="1" noRot="1" noChangeAspect="1"/>
+          </p:cNvSpPr>
+          <p:nvPr>
+            <p:ph type="sldImg" idx="2"/>
+          </p:nvPr>
+        </p:nvSpPr>
+        <p:spPr>
+          <a:xfrm>
+            <a:off x="381000" y="685800"/>
+            <a:ext cx="6096000" cy="3429000"/>
+          </a:xfrm>
+          <a:custGeom>
+            <a:avLst/>
+            <a:gdLst/>
+            <a:ahLst/>
+            <a:cxnLst/>
+            <a:rect l="l" t="t" r="r" b="b"/>
+            <a:pathLst>
+              <a:path w="120000" h="120000" extrusionOk="0">
+                <a:moveTo>
+                  <a:pt x="0" y="0"/>
+                </a:moveTo>
+                <a:lnTo>
+                  <a:pt x="120000" y="0"/>
+                </a:lnTo>
+                <a:lnTo>
+                  <a:pt x="120000" y="120000"/>
+                </a:lnTo>
+                <a:lnTo>
+                  <a:pt x="0" y="120000"/>
+                </a:lnTo>
+                <a:close/>
+              </a:path>
+            </a:pathLst>
+          </a:custGeom>
+        </p:spPr>
+      </p:sp>
+      <p:sp>
+        <p:nvSpPr>
+          <p:cNvPr id="150" name="Google Shape;150;g2f853ba87ba_0_250:notes"/>
+          <p:cNvSpPr txBox="1">
+            <a:spLocks noGrp="1"/>
+          </p:cNvSpPr>
+          <p:nvPr>
+            <p:ph type="body" idx="1"/>
+          </p:nvPr>
+        </p:nvSpPr>
+        <p:spPr>
+          <a:xfrm>
+            <a:off x="685800" y="4343400"/>
+            <a:ext cx="5486400" cy="4114800"/>
+          </a:xfrm>
+          <a:prstGeom prst="rect">
+            <a:avLst/>
+          </a:prstGeom>
+        </p:spPr>
+        <p:txBody>
+          <a:bodyPr spcFirstLastPara="1" wrap="square" lIns="91425" tIns="91425" rIns="91425" bIns="91425" anchor="t" anchorCtr="0">
+            <a:noAutofit/>
+          </a:bodyPr>
+          <a:lstStyle/>
+          <a:p>
+            <a:pPr marL="0" lvl="0" indent="0" algn="l" rtl="0">
+              <a:spcBef>
+                <a:spcPts val="0"/>
+              </a:spcBef>
+              <a:spcAft>
+                <a:spcPts val="0"/>
+              </a:spcAft>
+              <a:buNone/>
+            </a:pPr>
+            <a:endParaRPr/>
+          </a:p>
+        </p:txBody>
+      </p:sp>
+    </p:spTree>
+  </p:cSld>
+  <p:clrMapOvr>
+    <a:masterClrMapping/>
+  </p:clrMapOvr>
+</p:notes>
+</file>
+
+<file path=ppt/notesSlides/notesSlide21.xml><?xml version="1.0" encoding="utf-8"?>
+<p:notes xmlns:a="http://schemas.openxmlformats.org/drawingml/2006/main" xmlns:r="http://schemas.openxmlformats.org/officeDocument/2006/relationships" xmlns:p="http://schemas.openxmlformats.org/presentationml/2006/main" showMasterSp="0" showMasterPhAnim="0">
+  <p:cSld>
+    <p:spTree>
+      <p:nvGrpSpPr>
+        <p:cNvPr id="1" name="Shape 154"/>
+        <p:cNvGrpSpPr/>
+        <p:nvPr/>
+      </p:nvGrpSpPr>
+      <p:grpSpPr>
+        <a:xfrm>
+          <a:off x="0" y="0"/>
+          <a:ext cx="0" cy="0"/>
+          <a:chOff x="0" y="0"/>
+          <a:chExt cx="0" cy="0"/>
+        </a:xfrm>
+      </p:grpSpPr>
+      <p:sp>
+        <p:nvSpPr>
+          <p:cNvPr id="155" name="Google Shape;155;g2f853ba87ba_0_265:notes"/>
+          <p:cNvSpPr>
+            <a:spLocks noGrp="1" noRot="1" noChangeAspect="1"/>
+          </p:cNvSpPr>
+          <p:nvPr>
+            <p:ph type="sldImg" idx="2"/>
+          </p:nvPr>
+        </p:nvSpPr>
+        <p:spPr>
+          <a:xfrm>
+            <a:off x="381000" y="685800"/>
+            <a:ext cx="6096000" cy="3429000"/>
+          </a:xfrm>
+          <a:custGeom>
+            <a:avLst/>
+            <a:gdLst/>
+            <a:ahLst/>
+            <a:cxnLst/>
+            <a:rect l="l" t="t" r="r" b="b"/>
+            <a:pathLst>
+              <a:path w="120000" h="120000" extrusionOk="0">
+                <a:moveTo>
+                  <a:pt x="0" y="0"/>
+                </a:moveTo>
+                <a:lnTo>
+                  <a:pt x="120000" y="0"/>
+                </a:lnTo>
+                <a:lnTo>
+                  <a:pt x="120000" y="120000"/>
+                </a:lnTo>
+                <a:lnTo>
+                  <a:pt x="0" y="120000"/>
+                </a:lnTo>
+                <a:close/>
+              </a:path>
+            </a:pathLst>
+          </a:custGeom>
+        </p:spPr>
+      </p:sp>
+      <p:sp>
+        <p:nvSpPr>
+          <p:cNvPr id="156" name="Google Shape;156;g2f853ba87ba_0_265:notes"/>
+          <p:cNvSpPr txBox="1">
+            <a:spLocks noGrp="1"/>
+          </p:cNvSpPr>
+          <p:nvPr>
+            <p:ph type="body" idx="1"/>
+          </p:nvPr>
+        </p:nvSpPr>
+        <p:spPr>
+          <a:xfrm>
+            <a:off x="685800" y="4343400"/>
+            <a:ext cx="5486400" cy="4114800"/>
+          </a:xfrm>
+          <a:prstGeom prst="rect">
+            <a:avLst/>
+          </a:prstGeom>
+        </p:spPr>
+        <p:txBody>
+          <a:bodyPr spcFirstLastPara="1" wrap="square" lIns="91425" tIns="91425" rIns="91425" bIns="91425" anchor="t" anchorCtr="0">
+            <a:noAutofit/>
+          </a:bodyPr>
+          <a:lstStyle/>
+          <a:p>
+            <a:pPr marL="0" lvl="0" indent="0" algn="l" rtl="0">
+              <a:spcBef>
+                <a:spcPts val="0"/>
+              </a:spcBef>
+              <a:spcAft>
+                <a:spcPts val="0"/>
+              </a:spcAft>
+              <a:buNone/>
+            </a:pPr>
+            <a:endParaRPr/>
+          </a:p>
+        </p:txBody>
+      </p:sp>
+    </p:spTree>
+  </p:cSld>
+  <p:clrMapOvr>
+    <a:masterClrMapping/>
+  </p:clrMapOvr>
+</p:notes>
+</file>
+
 <file path=ppt/notesSlides/notesSlide3.xml><?xml version="1.0" encoding="utf-8"?>
 <p:notes xmlns:a="http://schemas.openxmlformats.org/drawingml/2006/main" xmlns:r="http://schemas.openxmlformats.org/officeDocument/2006/relationships" xmlns:p="http://schemas.openxmlformats.org/presentationml/2006/main" showMasterSp="0" showMasterPhAnim="0">
   <p:cSld>
@@ -2491,7 +2816,7 @@
   <p:cSld>
     <p:spTree>
       <p:nvGrpSpPr>
-        <p:cNvPr id="1" name="Shape 100"/>
+        <p:cNvPr id="1" name="Shape 93"/>
         <p:cNvGrpSpPr/>
         <p:nvPr/>
       </p:nvGrpSpPr>
@@ -2505,7 +2830,7 @@
       </p:grpSpPr>
       <p:sp>
         <p:nvSpPr>
-          <p:cNvPr id="101" name="Google Shape;101;g2f855a959a3_0_3:notes"/>
+          <p:cNvPr id="94" name="Google Shape;94;g2f853ba87ba_0_203:notes"/>
           <p:cNvSpPr>
             <a:spLocks noGrp="1" noRot="1" noChangeAspect="1"/>
           </p:cNvSpPr>
@@ -2546,7 +2871,7 @@
       </p:sp>
       <p:sp>
         <p:nvSpPr>
-          <p:cNvPr id="102" name="Google Shape;102;g2f855a959a3_0_3:notes"/>
+          <p:cNvPr id="95" name="Google Shape;95;g2f853ba87ba_0_203:notes"/>
           <p:cNvSpPr txBox="1">
             <a:spLocks noGrp="1"/>
           </p:cNvSpPr>
@@ -2583,6 +2908,11 @@
         </p:txBody>
       </p:sp>
     </p:spTree>
+    <p:extLst>
+      <p:ext uri="{BB962C8B-B14F-4D97-AF65-F5344CB8AC3E}">
+        <p14:creationId xmlns:p14="http://schemas.microsoft.com/office/powerpoint/2010/main" val="108257531"/>
+      </p:ext>
+    </p:extLst>
   </p:cSld>
   <p:clrMapOvr>
     <a:masterClrMapping/>
@@ -7577,6 +7907,443 @@
   <p:cSld>
     <p:spTree>
       <p:nvGrpSpPr>
+        <p:cNvPr id="1" name="Shape 96"/>
+        <p:cNvGrpSpPr/>
+        <p:nvPr/>
+      </p:nvGrpSpPr>
+      <p:grpSpPr>
+        <a:xfrm>
+          <a:off x="0" y="0"/>
+          <a:ext cx="0" cy="0"/>
+          <a:chOff x="0" y="0"/>
+          <a:chExt cx="0" cy="0"/>
+        </a:xfrm>
+      </p:grpSpPr>
+      <p:sp>
+        <p:nvSpPr>
+          <p:cNvPr id="97" name="Google Shape;97;p20"/>
+          <p:cNvSpPr txBox="1">
+            <a:spLocks noGrp="1"/>
+          </p:cNvSpPr>
+          <p:nvPr>
+            <p:ph type="title"/>
+          </p:nvPr>
+        </p:nvSpPr>
+        <p:spPr>
+          <a:xfrm>
+            <a:off x="311700" y="140225"/>
+            <a:ext cx="8520600" cy="572700"/>
+          </a:xfrm>
+          <a:prstGeom prst="rect">
+            <a:avLst/>
+          </a:prstGeom>
+        </p:spPr>
+        <p:txBody>
+          <a:bodyPr spcFirstLastPara="1" wrap="square" lIns="91425" tIns="91425" rIns="91425" bIns="91425" anchor="t" anchorCtr="0">
+            <a:normAutofit fontScale="90000"/>
+          </a:bodyPr>
+          <a:lstStyle/>
+          <a:p>
+            <a:pPr marL="0" lvl="0" indent="0" algn="ctr" rtl="0">
+              <a:spcBef>
+                <a:spcPts val="0"/>
+              </a:spcBef>
+              <a:spcAft>
+                <a:spcPts val="0"/>
+              </a:spcAft>
+              <a:buNone/>
+            </a:pPr>
+            <a:r>
+              <a:rPr lang="en" b="1">
+                <a:solidFill>
+                  <a:srgbClr val="4A86E8"/>
+                </a:solidFill>
+              </a:rPr>
+              <a:t>Deploying The Project On Cloud</a:t>
+            </a:r>
+            <a:endParaRPr b="1">
+              <a:solidFill>
+                <a:srgbClr val="4A86E8"/>
+              </a:solidFill>
+            </a:endParaRPr>
+          </a:p>
+        </p:txBody>
+      </p:sp>
+      <p:sp>
+        <p:nvSpPr>
+          <p:cNvPr id="98" name="Google Shape;98;p20"/>
+          <p:cNvSpPr txBox="1">
+            <a:spLocks noGrp="1"/>
+          </p:cNvSpPr>
+          <p:nvPr>
+            <p:ph type="body" idx="1"/>
+          </p:nvPr>
+        </p:nvSpPr>
+        <p:spPr>
+          <a:xfrm>
+            <a:off x="311700" y="703049"/>
+            <a:ext cx="8520600" cy="3875825"/>
+          </a:xfrm>
+          <a:prstGeom prst="rect">
+            <a:avLst/>
+          </a:prstGeom>
+        </p:spPr>
+        <p:txBody>
+          <a:bodyPr spcFirstLastPara="1" wrap="square" lIns="91425" tIns="91425" rIns="91425" bIns="91425" anchor="t" anchorCtr="0">
+            <a:normAutofit/>
+          </a:bodyPr>
+          <a:lstStyle/>
+          <a:p>
+            <a:endParaRPr lang="en" dirty="0" smtClean="0"/>
+          </a:p>
+          <a:p>
+            <a:endParaRPr lang="en" dirty="0"/>
+          </a:p>
+          <a:p>
+            <a:pPr marL="457200" lvl="0" indent="-342900" algn="l" rtl="0">
+              <a:spcBef>
+                <a:spcPts val="0"/>
+              </a:spcBef>
+              <a:spcAft>
+                <a:spcPts val="0"/>
+              </a:spcAft>
+              <a:buSzPts val="1800"/>
+              <a:buChar char="●"/>
+            </a:pPr>
+            <a:endParaRPr dirty="0"/>
+          </a:p>
+        </p:txBody>
+      </p:sp>
+      <p:pic>
+        <p:nvPicPr>
+          <p:cNvPr id="3" name="Picture 2"/>
+          <p:cNvPicPr>
+            <a:picLocks noChangeAspect="1"/>
+          </p:cNvPicPr>
+          <p:nvPr/>
+        </p:nvPicPr>
+        <p:blipFill>
+          <a:blip r:embed="rId3"/>
+          <a:stretch>
+            <a:fillRect/>
+          </a:stretch>
+        </p:blipFill>
+        <p:spPr>
+          <a:xfrm>
+            <a:off x="1576735" y="636377"/>
+            <a:ext cx="6501611" cy="4384176"/>
+          </a:xfrm>
+          <a:prstGeom prst="rect">
+            <a:avLst/>
+          </a:prstGeom>
+        </p:spPr>
+      </p:pic>
+    </p:spTree>
+    <p:extLst>
+      <p:ext uri="{BB962C8B-B14F-4D97-AF65-F5344CB8AC3E}">
+        <p14:creationId xmlns:p14="http://schemas.microsoft.com/office/powerpoint/2010/main" val="2714598177"/>
+      </p:ext>
+    </p:extLst>
+  </p:cSld>
+  <p:clrMapOvr>
+    <a:masterClrMapping/>
+  </p:clrMapOvr>
+</p:sld>
+</file>
+
+<file path=ppt/slides/slide11.xml><?xml version="1.0" encoding="utf-8"?>
+<p:sld xmlns:a="http://schemas.openxmlformats.org/drawingml/2006/main" xmlns:r="http://schemas.openxmlformats.org/officeDocument/2006/relationships" xmlns:p="http://schemas.openxmlformats.org/presentationml/2006/main">
+  <p:cSld>
+    <p:spTree>
+      <p:nvGrpSpPr>
+        <p:cNvPr id="1" name="Shape 96"/>
+        <p:cNvGrpSpPr/>
+        <p:nvPr/>
+      </p:nvGrpSpPr>
+      <p:grpSpPr>
+        <a:xfrm>
+          <a:off x="0" y="0"/>
+          <a:ext cx="0" cy="0"/>
+          <a:chOff x="0" y="0"/>
+          <a:chExt cx="0" cy="0"/>
+        </a:xfrm>
+      </p:grpSpPr>
+      <p:sp>
+        <p:nvSpPr>
+          <p:cNvPr id="97" name="Google Shape;97;p20"/>
+          <p:cNvSpPr txBox="1">
+            <a:spLocks noGrp="1"/>
+          </p:cNvSpPr>
+          <p:nvPr>
+            <p:ph type="title"/>
+          </p:nvPr>
+        </p:nvSpPr>
+        <p:spPr>
+          <a:xfrm>
+            <a:off x="311700" y="140225"/>
+            <a:ext cx="8520600" cy="572700"/>
+          </a:xfrm>
+          <a:prstGeom prst="rect">
+            <a:avLst/>
+          </a:prstGeom>
+        </p:spPr>
+        <p:txBody>
+          <a:bodyPr spcFirstLastPara="1" wrap="square" lIns="91425" tIns="91425" rIns="91425" bIns="91425" anchor="t" anchorCtr="0">
+            <a:normAutofit fontScale="90000"/>
+          </a:bodyPr>
+          <a:lstStyle/>
+          <a:p>
+            <a:pPr marL="0" lvl="0" indent="0" algn="ctr" rtl="0">
+              <a:spcBef>
+                <a:spcPts val="0"/>
+              </a:spcBef>
+              <a:spcAft>
+                <a:spcPts val="0"/>
+              </a:spcAft>
+              <a:buNone/>
+            </a:pPr>
+            <a:r>
+              <a:rPr lang="en" b="1">
+                <a:solidFill>
+                  <a:srgbClr val="4A86E8"/>
+                </a:solidFill>
+              </a:rPr>
+              <a:t>Deploying The Project On Cloud</a:t>
+            </a:r>
+            <a:endParaRPr b="1">
+              <a:solidFill>
+                <a:srgbClr val="4A86E8"/>
+              </a:solidFill>
+            </a:endParaRPr>
+          </a:p>
+        </p:txBody>
+      </p:sp>
+      <p:sp>
+        <p:nvSpPr>
+          <p:cNvPr id="98" name="Google Shape;98;p20"/>
+          <p:cNvSpPr txBox="1">
+            <a:spLocks noGrp="1"/>
+          </p:cNvSpPr>
+          <p:nvPr>
+            <p:ph type="body" idx="1"/>
+          </p:nvPr>
+        </p:nvSpPr>
+        <p:spPr>
+          <a:xfrm>
+            <a:off x="311700" y="703050"/>
+            <a:ext cx="8520600" cy="1868700"/>
+          </a:xfrm>
+          <a:prstGeom prst="rect">
+            <a:avLst/>
+          </a:prstGeom>
+        </p:spPr>
+        <p:txBody>
+          <a:bodyPr spcFirstLastPara="1" wrap="square" lIns="91425" tIns="91425" rIns="91425" bIns="91425" anchor="t" anchorCtr="0">
+            <a:normAutofit/>
+          </a:bodyPr>
+          <a:lstStyle/>
+          <a:p>
+            <a:pPr marL="457200" lvl="0" indent="-342900" algn="l" rtl="0">
+              <a:spcBef>
+                <a:spcPts val="0"/>
+              </a:spcBef>
+              <a:spcAft>
+                <a:spcPts val="0"/>
+              </a:spcAft>
+              <a:buSzPts val="1800"/>
+              <a:buChar char="●"/>
+            </a:pPr>
+            <a:r>
+              <a:rPr lang="en"/>
+              <a:t>We use the model.pkl to store the trained K-Means models, and serializing using pickle module.</a:t>
+            </a:r>
+            <a:endParaRPr/>
+          </a:p>
+          <a:p>
+            <a:pPr marL="457200" lvl="0" indent="-342900" algn="l" rtl="0">
+              <a:spcBef>
+                <a:spcPts val="0"/>
+              </a:spcBef>
+              <a:spcAft>
+                <a:spcPts val="0"/>
+              </a:spcAft>
+              <a:buSzPts val="1800"/>
+              <a:buChar char="●"/>
+            </a:pPr>
+            <a:r>
+              <a:rPr lang="en"/>
+              <a:t>We can then Flask App and a app.yaml file to visualize our model through a web application.</a:t>
+            </a:r>
+            <a:endParaRPr/>
+          </a:p>
+          <a:p>
+            <a:pPr marL="457200" lvl="0" indent="-342900" algn="l" rtl="0">
+              <a:spcBef>
+                <a:spcPts val="0"/>
+              </a:spcBef>
+              <a:spcAft>
+                <a:spcPts val="0"/>
+              </a:spcAft>
+              <a:buSzPts val="1800"/>
+              <a:buChar char="●"/>
+            </a:pPr>
+            <a:r>
+              <a:rPr lang="en"/>
+              <a:t>We then deployed our model over Google cloud.</a:t>
+            </a:r>
+            <a:endParaRPr/>
+          </a:p>
+        </p:txBody>
+      </p:sp>
+      <p:pic>
+        <p:nvPicPr>
+          <p:cNvPr id="99" name="Google Shape;99;p20"/>
+          <p:cNvPicPr preferRelativeResize="0"/>
+          <p:nvPr/>
+        </p:nvPicPr>
+        <p:blipFill>
+          <a:blip r:embed="rId3">
+            <a:alphaModFix/>
+          </a:blip>
+          <a:stretch>
+            <a:fillRect/>
+          </a:stretch>
+        </p:blipFill>
+        <p:spPr>
+          <a:xfrm>
+            <a:off x="800275" y="2571750"/>
+            <a:ext cx="7179149" cy="2362025"/>
+          </a:xfrm>
+          <a:prstGeom prst="rect">
+            <a:avLst/>
+          </a:prstGeom>
+          <a:noFill/>
+          <a:ln>
+            <a:noFill/>
+          </a:ln>
+        </p:spPr>
+      </p:pic>
+    </p:spTree>
+    <p:extLst>
+      <p:ext uri="{BB962C8B-B14F-4D97-AF65-F5344CB8AC3E}">
+        <p14:creationId xmlns:p14="http://schemas.microsoft.com/office/powerpoint/2010/main" val="862923122"/>
+      </p:ext>
+    </p:extLst>
+  </p:cSld>
+  <p:clrMapOvr>
+    <a:masterClrMapping/>
+  </p:clrMapOvr>
+</p:sld>
+</file>
+
+<file path=ppt/slides/slide12.xml><?xml version="1.0" encoding="utf-8"?>
+<p:sld xmlns:a="http://schemas.openxmlformats.org/drawingml/2006/main" xmlns:r="http://schemas.openxmlformats.org/officeDocument/2006/relationships" xmlns:p="http://schemas.openxmlformats.org/presentationml/2006/main">
+  <p:cSld>
+    <p:spTree>
+      <p:nvGrpSpPr>
+        <p:cNvPr id="1" name="Shape 103"/>
+        <p:cNvGrpSpPr/>
+        <p:nvPr/>
+      </p:nvGrpSpPr>
+      <p:grpSpPr>
+        <a:xfrm>
+          <a:off x="0" y="0"/>
+          <a:ext cx="0" cy="0"/>
+          <a:chOff x="0" y="0"/>
+          <a:chExt cx="0" cy="0"/>
+        </a:xfrm>
+      </p:grpSpPr>
+      <p:sp>
+        <p:nvSpPr>
+          <p:cNvPr id="104" name="Google Shape;104;p21"/>
+          <p:cNvSpPr txBox="1">
+            <a:spLocks noGrp="1"/>
+          </p:cNvSpPr>
+          <p:nvPr>
+            <p:ph type="title"/>
+          </p:nvPr>
+        </p:nvSpPr>
+        <p:spPr>
+          <a:xfrm>
+            <a:off x="311700" y="140225"/>
+            <a:ext cx="8520600" cy="572700"/>
+          </a:xfrm>
+          <a:prstGeom prst="rect">
+            <a:avLst/>
+          </a:prstGeom>
+        </p:spPr>
+        <p:txBody>
+          <a:bodyPr spcFirstLastPara="1" wrap="square" lIns="91425" tIns="91425" rIns="91425" bIns="91425" anchor="t" anchorCtr="0">
+            <a:normAutofit fontScale="90000"/>
+          </a:bodyPr>
+          <a:lstStyle/>
+          <a:p>
+            <a:pPr marL="0" lvl="0" indent="0" algn="ctr" rtl="0">
+              <a:spcBef>
+                <a:spcPts val="0"/>
+              </a:spcBef>
+              <a:spcAft>
+                <a:spcPts val="0"/>
+              </a:spcAft>
+              <a:buNone/>
+            </a:pPr>
+            <a:r>
+              <a:rPr lang="en" b="1">
+                <a:solidFill>
+                  <a:srgbClr val="4A86E8"/>
+                </a:solidFill>
+              </a:rPr>
+              <a:t>Deploying The Project On Cloud</a:t>
+            </a:r>
+            <a:endParaRPr b="1">
+              <a:solidFill>
+                <a:srgbClr val="4A86E8"/>
+              </a:solidFill>
+            </a:endParaRPr>
+          </a:p>
+        </p:txBody>
+      </p:sp>
+      <p:pic>
+        <p:nvPicPr>
+          <p:cNvPr id="105" name="Google Shape;105;p21"/>
+          <p:cNvPicPr preferRelativeResize="0"/>
+          <p:nvPr/>
+        </p:nvPicPr>
+        <p:blipFill>
+          <a:blip r:embed="rId3">
+            <a:alphaModFix/>
+          </a:blip>
+          <a:stretch>
+            <a:fillRect/>
+          </a:stretch>
+        </p:blipFill>
+        <p:spPr>
+          <a:xfrm>
+            <a:off x="311700" y="896400"/>
+            <a:ext cx="8679899" cy="4125776"/>
+          </a:xfrm>
+          <a:prstGeom prst="rect">
+            <a:avLst/>
+          </a:prstGeom>
+          <a:noFill/>
+          <a:ln>
+            <a:noFill/>
+          </a:ln>
+        </p:spPr>
+      </p:pic>
+    </p:spTree>
+  </p:cSld>
+  <p:clrMapOvr>
+    <a:masterClrMapping/>
+  </p:clrMapOvr>
+</p:sld>
+</file>
+
+<file path=ppt/slides/slide13.xml><?xml version="1.0" encoding="utf-8"?>
+<p:sld xmlns:a="http://schemas.openxmlformats.org/drawingml/2006/main" xmlns:r="http://schemas.openxmlformats.org/officeDocument/2006/relationships" xmlns:p="http://schemas.openxmlformats.org/presentationml/2006/main">
+  <p:cSld>
+    <p:spTree>
+      <p:nvGrpSpPr>
         <p:cNvPr id="1" name="Shape 109"/>
         <p:cNvGrpSpPr/>
         <p:nvPr/>
@@ -7675,7 +8442,7 @@
 </p:sld>
 </file>
 
-<file path=ppt/slides/slide11.xml><?xml version="1.0" encoding="utf-8"?>
+<file path=ppt/slides/slide14.xml><?xml version="1.0" encoding="utf-8"?>
 <p:sld xmlns:a="http://schemas.openxmlformats.org/drawingml/2006/main" xmlns:r="http://schemas.openxmlformats.org/officeDocument/2006/relationships" xmlns:p="http://schemas.openxmlformats.org/presentationml/2006/main">
   <p:cSld>
     <p:spTree>
@@ -7778,7 +8545,7 @@
 </p:sld>
 </file>
 
-<file path=ppt/slides/slide12.xml><?xml version="1.0" encoding="utf-8"?>
+<file path=ppt/slides/slide15.xml><?xml version="1.0" encoding="utf-8"?>
 <p:sld xmlns:a="http://schemas.openxmlformats.org/drawingml/2006/main" xmlns:r="http://schemas.openxmlformats.org/officeDocument/2006/relationships" xmlns:p="http://schemas.openxmlformats.org/presentationml/2006/main">
   <p:cSld>
     <p:spTree>
@@ -7881,7 +8648,7 @@
 </p:sld>
 </file>
 
-<file path=ppt/slides/slide13.xml><?xml version="1.0" encoding="utf-8"?>
+<file path=ppt/slides/slide16.xml><?xml version="1.0" encoding="utf-8"?>
 <p:sld xmlns:a="http://schemas.openxmlformats.org/drawingml/2006/main" xmlns:r="http://schemas.openxmlformats.org/officeDocument/2006/relationships" xmlns:p="http://schemas.openxmlformats.org/presentationml/2006/main">
   <p:cSld>
     <p:spTree>
@@ -7984,7 +8751,7 @@
 </p:sld>
 </file>
 
-<file path=ppt/slides/slide14.xml><?xml version="1.0" encoding="utf-8"?>
+<file path=ppt/slides/slide17.xml><?xml version="1.0" encoding="utf-8"?>
 <p:sld xmlns:a="http://schemas.openxmlformats.org/drawingml/2006/main" xmlns:r="http://schemas.openxmlformats.org/officeDocument/2006/relationships" xmlns:p="http://schemas.openxmlformats.org/presentationml/2006/main">
   <p:cSld>
     <p:spTree>
@@ -8129,7 +8896,7 @@
 </p:sld>
 </file>
 
-<file path=ppt/slides/slide15.xml><?xml version="1.0" encoding="utf-8"?>
+<file path=ppt/slides/slide18.xml><?xml version="1.0" encoding="utf-8"?>
 <p:sld xmlns:a="http://schemas.openxmlformats.org/drawingml/2006/main" xmlns:r="http://schemas.openxmlformats.org/officeDocument/2006/relationships" xmlns:p="http://schemas.openxmlformats.org/presentationml/2006/main">
   <p:cSld>
     <p:bg>
@@ -8190,7 +8957,7 @@
 </p:sld>
 </file>
 
-<file path=ppt/slides/slide16.xml><?xml version="1.0" encoding="utf-8"?>
+<file path=ppt/slides/slide19.xml><?xml version="1.0" encoding="utf-8"?>
 <p:sld xmlns:a="http://schemas.openxmlformats.org/drawingml/2006/main" xmlns:r="http://schemas.openxmlformats.org/officeDocument/2006/relationships" xmlns:p="http://schemas.openxmlformats.org/presentationml/2006/main">
   <p:cSld>
     <p:spTree>
@@ -8473,199 +9240,6 @@
               <a:buNone/>
             </a:pPr>
             <a:endParaRPr sz="2900"/>
-          </a:p>
-        </p:txBody>
-      </p:sp>
-    </p:spTree>
-  </p:cSld>
-  <p:clrMapOvr>
-    <a:masterClrMapping/>
-  </p:clrMapOvr>
-</p:sld>
-</file>
-
-<file path=ppt/slides/slide17.xml><?xml version="1.0" encoding="utf-8"?>
-<p:sld xmlns:a="http://schemas.openxmlformats.org/drawingml/2006/main" xmlns:r="http://schemas.openxmlformats.org/officeDocument/2006/relationships" xmlns:p="http://schemas.openxmlformats.org/presentationml/2006/main">
-  <p:cSld>
-    <p:spTree>
-      <p:nvGrpSpPr>
-        <p:cNvPr id="1" name="Shape 151"/>
-        <p:cNvGrpSpPr/>
-        <p:nvPr/>
-      </p:nvGrpSpPr>
-      <p:grpSpPr>
-        <a:xfrm>
-          <a:off x="0" y="0"/>
-          <a:ext cx="0" cy="0"/>
-          <a:chOff x="0" y="0"/>
-          <a:chExt cx="0" cy="0"/>
-        </a:xfrm>
-      </p:grpSpPr>
-      <p:sp>
-        <p:nvSpPr>
-          <p:cNvPr id="152" name="Google Shape;152;p29"/>
-          <p:cNvSpPr txBox="1">
-            <a:spLocks noGrp="1"/>
-          </p:cNvSpPr>
-          <p:nvPr>
-            <p:ph type="title"/>
-          </p:nvPr>
-        </p:nvSpPr>
-        <p:spPr>
-          <a:xfrm>
-            <a:off x="311700" y="445025"/>
-            <a:ext cx="8520600" cy="572700"/>
-          </a:xfrm>
-          <a:prstGeom prst="rect">
-            <a:avLst/>
-          </a:prstGeom>
-        </p:spPr>
-        <p:txBody>
-          <a:bodyPr spcFirstLastPara="1" wrap="square" lIns="91425" tIns="91425" rIns="91425" bIns="91425" anchor="t" anchorCtr="0">
-            <a:noAutofit/>
-          </a:bodyPr>
-          <a:lstStyle/>
-          <a:p>
-            <a:pPr marL="0" lvl="0" indent="0" algn="ctr" rtl="0">
-              <a:spcBef>
-                <a:spcPts val="0"/>
-              </a:spcBef>
-              <a:spcAft>
-                <a:spcPts val="0"/>
-              </a:spcAft>
-              <a:buSzPts val="990"/>
-              <a:buNone/>
-            </a:pPr>
-            <a:r>
-              <a:rPr lang="en" sz="5020" b="1">
-                <a:solidFill>
-                  <a:srgbClr val="351C75"/>
-                </a:solidFill>
-              </a:rPr>
-              <a:t>CONCLUSION</a:t>
-            </a:r>
-            <a:endParaRPr sz="5020" b="1">
-              <a:solidFill>
-                <a:srgbClr val="351C75"/>
-              </a:solidFill>
-            </a:endParaRPr>
-          </a:p>
-        </p:txBody>
-      </p:sp>
-      <p:sp>
-        <p:nvSpPr>
-          <p:cNvPr id="153" name="Google Shape;153;p29"/>
-          <p:cNvSpPr txBox="1">
-            <a:spLocks noGrp="1"/>
-          </p:cNvSpPr>
-          <p:nvPr>
-            <p:ph type="body" idx="1"/>
-          </p:nvPr>
-        </p:nvSpPr>
-        <p:spPr>
-          <a:xfrm>
-            <a:off x="311700" y="1914475"/>
-            <a:ext cx="8520600" cy="3416400"/>
-          </a:xfrm>
-          <a:prstGeom prst="rect">
-            <a:avLst/>
-          </a:prstGeom>
-        </p:spPr>
-        <p:txBody>
-          <a:bodyPr spcFirstLastPara="1" wrap="square" lIns="91425" tIns="91425" rIns="91425" bIns="91425" anchor="t" anchorCtr="0">
-            <a:normAutofit/>
-          </a:bodyPr>
-          <a:lstStyle/>
-          <a:p>
-            <a:pPr marL="0" lvl="0" indent="0" algn="l" rtl="0">
-              <a:spcBef>
-                <a:spcPts val="0"/>
-              </a:spcBef>
-              <a:spcAft>
-                <a:spcPts val="1200"/>
-              </a:spcAft>
-              <a:buNone/>
-            </a:pPr>
-            <a:r>
-              <a:rPr lang="en" sz="2500"/>
-              <a:t>Deploying the customer segmentation application on GCP not only improved scalability and security but also provided a powerful platform for innovation, paving the way for future enhancements and expansions in data-driven decision-making.</a:t>
-            </a:r>
-            <a:endParaRPr sz="2500"/>
-          </a:p>
-        </p:txBody>
-      </p:sp>
-    </p:spTree>
-  </p:cSld>
-  <p:clrMapOvr>
-    <a:masterClrMapping/>
-  </p:clrMapOvr>
-</p:sld>
-</file>
-
-<file path=ppt/slides/slide18.xml><?xml version="1.0" encoding="utf-8"?>
-<p:sld xmlns:a="http://schemas.openxmlformats.org/drawingml/2006/main" xmlns:r="http://schemas.openxmlformats.org/officeDocument/2006/relationships" xmlns:p="http://schemas.openxmlformats.org/presentationml/2006/main">
-  <p:cSld>
-    <p:spTree>
-      <p:nvGrpSpPr>
-        <p:cNvPr id="1" name="Shape 157"/>
-        <p:cNvGrpSpPr/>
-        <p:nvPr/>
-      </p:nvGrpSpPr>
-      <p:grpSpPr>
-        <a:xfrm>
-          <a:off x="0" y="0"/>
-          <a:ext cx="0" cy="0"/>
-          <a:chOff x="0" y="0"/>
-          <a:chExt cx="0" cy="0"/>
-        </a:xfrm>
-      </p:grpSpPr>
-      <p:sp>
-        <p:nvSpPr>
-          <p:cNvPr id="158" name="Google Shape;158;p30"/>
-          <p:cNvSpPr txBox="1">
-            <a:spLocks noGrp="1"/>
-          </p:cNvSpPr>
-          <p:nvPr>
-            <p:ph type="title"/>
-          </p:nvPr>
-        </p:nvSpPr>
-        <p:spPr>
-          <a:xfrm>
-            <a:off x="1305500" y="526350"/>
-            <a:ext cx="6367800" cy="4090800"/>
-          </a:xfrm>
-          <a:prstGeom prst="rect">
-            <a:avLst/>
-          </a:prstGeom>
-        </p:spPr>
-        <p:txBody>
-          <a:bodyPr spcFirstLastPara="1" wrap="square" lIns="91425" tIns="91425" rIns="91425" bIns="91425" anchor="ctr" anchorCtr="0">
-            <a:normAutofit/>
-          </a:bodyPr>
-          <a:lstStyle/>
-          <a:p>
-            <a:pPr marL="0" lvl="0" indent="0" algn="ctr" rtl="0">
-              <a:spcBef>
-                <a:spcPts val="0"/>
-              </a:spcBef>
-              <a:spcAft>
-                <a:spcPts val="0"/>
-              </a:spcAft>
-              <a:buNone/>
-            </a:pPr>
-            <a:r>
-              <a:rPr lang="en" sz="5400" b="1">
-                <a:solidFill>
-                  <a:srgbClr val="0B5394"/>
-                </a:solidFill>
-              </a:rPr>
-              <a:t>THANK YOU</a:t>
-            </a:r>
-            <a:endParaRPr sz="5400" b="1">
-              <a:solidFill>
-                <a:srgbClr val="0B5394"/>
-              </a:solidFill>
-            </a:endParaRPr>
           </a:p>
         </p:txBody>
       </p:sp>
@@ -8876,6 +9450,199 @@
 </p:sld>
 </file>
 
+<file path=ppt/slides/slide20.xml><?xml version="1.0" encoding="utf-8"?>
+<p:sld xmlns:a="http://schemas.openxmlformats.org/drawingml/2006/main" xmlns:r="http://schemas.openxmlformats.org/officeDocument/2006/relationships" xmlns:p="http://schemas.openxmlformats.org/presentationml/2006/main">
+  <p:cSld>
+    <p:spTree>
+      <p:nvGrpSpPr>
+        <p:cNvPr id="1" name="Shape 151"/>
+        <p:cNvGrpSpPr/>
+        <p:nvPr/>
+      </p:nvGrpSpPr>
+      <p:grpSpPr>
+        <a:xfrm>
+          <a:off x="0" y="0"/>
+          <a:ext cx="0" cy="0"/>
+          <a:chOff x="0" y="0"/>
+          <a:chExt cx="0" cy="0"/>
+        </a:xfrm>
+      </p:grpSpPr>
+      <p:sp>
+        <p:nvSpPr>
+          <p:cNvPr id="152" name="Google Shape;152;p29"/>
+          <p:cNvSpPr txBox="1">
+            <a:spLocks noGrp="1"/>
+          </p:cNvSpPr>
+          <p:nvPr>
+            <p:ph type="title"/>
+          </p:nvPr>
+        </p:nvSpPr>
+        <p:spPr>
+          <a:xfrm>
+            <a:off x="311700" y="445025"/>
+            <a:ext cx="8520600" cy="572700"/>
+          </a:xfrm>
+          <a:prstGeom prst="rect">
+            <a:avLst/>
+          </a:prstGeom>
+        </p:spPr>
+        <p:txBody>
+          <a:bodyPr spcFirstLastPara="1" wrap="square" lIns="91425" tIns="91425" rIns="91425" bIns="91425" anchor="t" anchorCtr="0">
+            <a:noAutofit/>
+          </a:bodyPr>
+          <a:lstStyle/>
+          <a:p>
+            <a:pPr marL="0" lvl="0" indent="0" algn="ctr" rtl="0">
+              <a:spcBef>
+                <a:spcPts val="0"/>
+              </a:spcBef>
+              <a:spcAft>
+                <a:spcPts val="0"/>
+              </a:spcAft>
+              <a:buSzPts val="990"/>
+              <a:buNone/>
+            </a:pPr>
+            <a:r>
+              <a:rPr lang="en" sz="5020" b="1">
+                <a:solidFill>
+                  <a:srgbClr val="351C75"/>
+                </a:solidFill>
+              </a:rPr>
+              <a:t>CONCLUSION</a:t>
+            </a:r>
+            <a:endParaRPr sz="5020" b="1">
+              <a:solidFill>
+                <a:srgbClr val="351C75"/>
+              </a:solidFill>
+            </a:endParaRPr>
+          </a:p>
+        </p:txBody>
+      </p:sp>
+      <p:sp>
+        <p:nvSpPr>
+          <p:cNvPr id="153" name="Google Shape;153;p29"/>
+          <p:cNvSpPr txBox="1">
+            <a:spLocks noGrp="1"/>
+          </p:cNvSpPr>
+          <p:nvPr>
+            <p:ph type="body" idx="1"/>
+          </p:nvPr>
+        </p:nvSpPr>
+        <p:spPr>
+          <a:xfrm>
+            <a:off x="311700" y="1914475"/>
+            <a:ext cx="8520600" cy="3416400"/>
+          </a:xfrm>
+          <a:prstGeom prst="rect">
+            <a:avLst/>
+          </a:prstGeom>
+        </p:spPr>
+        <p:txBody>
+          <a:bodyPr spcFirstLastPara="1" wrap="square" lIns="91425" tIns="91425" rIns="91425" bIns="91425" anchor="t" anchorCtr="0">
+            <a:normAutofit/>
+          </a:bodyPr>
+          <a:lstStyle/>
+          <a:p>
+            <a:pPr marL="0" lvl="0" indent="0" algn="l" rtl="0">
+              <a:spcBef>
+                <a:spcPts val="0"/>
+              </a:spcBef>
+              <a:spcAft>
+                <a:spcPts val="1200"/>
+              </a:spcAft>
+              <a:buNone/>
+            </a:pPr>
+            <a:r>
+              <a:rPr lang="en" sz="2500"/>
+              <a:t>Deploying the customer segmentation application on GCP not only improved scalability and security but also provided a powerful platform for innovation, paving the way for future enhancements and expansions in data-driven decision-making.</a:t>
+            </a:r>
+            <a:endParaRPr sz="2500"/>
+          </a:p>
+        </p:txBody>
+      </p:sp>
+    </p:spTree>
+  </p:cSld>
+  <p:clrMapOvr>
+    <a:masterClrMapping/>
+  </p:clrMapOvr>
+</p:sld>
+</file>
+
+<file path=ppt/slides/slide21.xml><?xml version="1.0" encoding="utf-8"?>
+<p:sld xmlns:a="http://schemas.openxmlformats.org/drawingml/2006/main" xmlns:r="http://schemas.openxmlformats.org/officeDocument/2006/relationships" xmlns:p="http://schemas.openxmlformats.org/presentationml/2006/main">
+  <p:cSld>
+    <p:spTree>
+      <p:nvGrpSpPr>
+        <p:cNvPr id="1" name="Shape 157"/>
+        <p:cNvGrpSpPr/>
+        <p:nvPr/>
+      </p:nvGrpSpPr>
+      <p:grpSpPr>
+        <a:xfrm>
+          <a:off x="0" y="0"/>
+          <a:ext cx="0" cy="0"/>
+          <a:chOff x="0" y="0"/>
+          <a:chExt cx="0" cy="0"/>
+        </a:xfrm>
+      </p:grpSpPr>
+      <p:sp>
+        <p:nvSpPr>
+          <p:cNvPr id="158" name="Google Shape;158;p30"/>
+          <p:cNvSpPr txBox="1">
+            <a:spLocks noGrp="1"/>
+          </p:cNvSpPr>
+          <p:nvPr>
+            <p:ph type="title"/>
+          </p:nvPr>
+        </p:nvSpPr>
+        <p:spPr>
+          <a:xfrm>
+            <a:off x="1305500" y="526350"/>
+            <a:ext cx="6367800" cy="4090800"/>
+          </a:xfrm>
+          <a:prstGeom prst="rect">
+            <a:avLst/>
+          </a:prstGeom>
+        </p:spPr>
+        <p:txBody>
+          <a:bodyPr spcFirstLastPara="1" wrap="square" lIns="91425" tIns="91425" rIns="91425" bIns="91425" anchor="ctr" anchorCtr="0">
+            <a:normAutofit/>
+          </a:bodyPr>
+          <a:lstStyle/>
+          <a:p>
+            <a:pPr marL="0" lvl="0" indent="0" algn="ctr" rtl="0">
+              <a:spcBef>
+                <a:spcPts val="0"/>
+              </a:spcBef>
+              <a:spcAft>
+                <a:spcPts val="0"/>
+              </a:spcAft>
+              <a:buNone/>
+            </a:pPr>
+            <a:r>
+              <a:rPr lang="en" sz="5400" b="1">
+                <a:solidFill>
+                  <a:srgbClr val="0B5394"/>
+                </a:solidFill>
+              </a:rPr>
+              <a:t>THANK YOU</a:t>
+            </a:r>
+            <a:endParaRPr sz="5400" b="1">
+              <a:solidFill>
+                <a:srgbClr val="0B5394"/>
+              </a:solidFill>
+            </a:endParaRPr>
+          </a:p>
+        </p:txBody>
+      </p:sp>
+    </p:spTree>
+  </p:cSld>
+  <p:clrMapOvr>
+    <a:masterClrMapping/>
+  </p:clrMapOvr>
+</p:sld>
+</file>
+
 <file path=ppt/slides/slide3.xml><?xml version="1.0" encoding="utf-8"?>
 <p:sld xmlns:a="http://schemas.openxmlformats.org/drawingml/2006/main" xmlns:r="http://schemas.openxmlformats.org/officeDocument/2006/relationships" xmlns:p="http://schemas.openxmlformats.org/presentationml/2006/main">
   <p:cSld>
@@ -10004,8 +10771,8 @@
         </p:nvSpPr>
         <p:spPr>
           <a:xfrm>
-            <a:off x="311700" y="703050"/>
-            <a:ext cx="8520600" cy="1868700"/>
+            <a:off x="311700" y="703049"/>
+            <a:ext cx="8520600" cy="3875825"/>
           </a:xfrm>
           <a:prstGeom prst="rect">
             <a:avLst/>
@@ -10017,6 +10784,49 @@
           </a:bodyPr>
           <a:lstStyle/>
           <a:p>
+            <a:endParaRPr lang="en" dirty="0" smtClean="0"/>
+          </a:p>
+          <a:p>
+            <a:endParaRPr lang="en" dirty="0"/>
+          </a:p>
+          <a:p>
+            <a:r>
+              <a:rPr lang="en" dirty="0" smtClean="0"/>
+              <a:t>We created a project </a:t>
+            </a:r>
+            <a:r>
+              <a:rPr lang="en-US" b="1" dirty="0" smtClean="0"/>
+              <a:t>vcc-assignment-g23ai2014 on </a:t>
+            </a:r>
+            <a:r>
+              <a:rPr lang="en-US" dirty="0" smtClean="0"/>
+              <a:t>GCP</a:t>
+            </a:r>
+          </a:p>
+          <a:p>
+            <a:pPr marL="114300" indent="0">
+              <a:buNone/>
+            </a:pPr>
+            <a:r>
+              <a:rPr lang="en-US" dirty="0" smtClean="0"/>
+              <a:t>      and used the same under which our model get deployed </a:t>
+            </a:r>
+          </a:p>
+          <a:p>
+            <a:r>
+              <a:rPr lang="en-US" dirty="0" smtClean="0"/>
+              <a:t>We used </a:t>
+            </a:r>
+            <a:r>
+              <a:rPr lang="en-US" b="1" dirty="0" smtClean="0"/>
+              <a:t>app engine </a:t>
+            </a:r>
+            <a:r>
+              <a:rPr lang="en-US" dirty="0" smtClean="0"/>
+              <a:t>service to host our application</a:t>
+            </a:r>
+          </a:p>
+          <a:p>
             <a:pPr marL="457200" lvl="0" indent="-342900" algn="l" rtl="0">
               <a:spcBef>
                 <a:spcPts val="0"/>
@@ -10028,10 +10838,14 @@
               <a:buChar char="●"/>
             </a:pPr>
             <a:r>
-              <a:rPr lang="en"/>
-              <a:t>We use the model.pkl to store the trained K-Means models, and serializing using pickle module.</a:t>
+              <a:rPr lang="en" dirty="0" smtClean="0"/>
+              <a:t>We </a:t>
             </a:r>
-            <a:endParaRPr/>
+            <a:r>
+              <a:rPr lang="en" dirty="0"/>
+              <a:t>use the model.pkl to store the trained K-Means models, and serializing using pickle module.</a:t>
+            </a:r>
+            <a:endParaRPr dirty="0"/>
           </a:p>
           <a:p>
             <a:pPr marL="457200" lvl="0" indent="-342900" algn="l" rtl="0">
@@ -10045,10 +10859,10 @@
               <a:buChar char="●"/>
             </a:pPr>
             <a:r>
-              <a:rPr lang="en"/>
+              <a:rPr lang="en" dirty="0"/>
               <a:t>We can then Flask App and a app.yaml file to visualize our model through a web application.</a:t>
             </a:r>
-            <a:endParaRPr/>
+            <a:endParaRPr dirty="0"/>
           </a:p>
           <a:p>
             <a:pPr marL="457200" lvl="0" indent="-342900" algn="l" rtl="0">
@@ -10062,41 +10876,29 @@
               <a:buChar char="●"/>
             </a:pPr>
             <a:r>
-              <a:rPr lang="en"/>
-              <a:t>We then deployed our model over Google cloud.</a:t>
+              <a:rPr lang="en" dirty="0"/>
+              <a:t>We then deployed our model over Google cloud</a:t>
             </a:r>
-            <a:endParaRPr/>
+            <a:r>
+              <a:rPr lang="en" dirty="0" smtClean="0"/>
+              <a:t>.</a:t>
+            </a:r>
+          </a:p>
+          <a:p>
+            <a:pPr marL="457200" lvl="0" indent="-342900" algn="l" rtl="0">
+              <a:spcBef>
+                <a:spcPts val="0"/>
+              </a:spcBef>
+              <a:spcAft>
+                <a:spcPts val="0"/>
+              </a:spcAft>
+              <a:buSzPts val="1800"/>
+              <a:buChar char="●"/>
+            </a:pPr>
+            <a:endParaRPr dirty="0"/>
           </a:p>
         </p:txBody>
       </p:sp>
-      <p:pic>
-        <p:nvPicPr>
-          <p:cNvPr id="99" name="Google Shape;99;p20"/>
-          <p:cNvPicPr preferRelativeResize="0"/>
-          <p:nvPr/>
-        </p:nvPicPr>
-        <p:blipFill>
-          <a:blip r:embed="rId3">
-            <a:alphaModFix/>
-          </a:blip>
-          <a:stretch>
-            <a:fillRect/>
-          </a:stretch>
-        </p:blipFill>
-        <p:spPr>
-          <a:xfrm>
-            <a:off x="800275" y="2571750"/>
-            <a:ext cx="7179149" cy="2362025"/>
-          </a:xfrm>
-          <a:prstGeom prst="rect">
-            <a:avLst/>
-          </a:prstGeom>
-          <a:noFill/>
-          <a:ln>
-            <a:noFill/>
-          </a:ln>
-        </p:spPr>
-      </p:pic>
     </p:spTree>
   </p:cSld>
   <p:clrMapOvr>
@@ -10110,7 +10912,7 @@
   <p:cSld>
     <p:spTree>
       <p:nvGrpSpPr>
-        <p:cNvPr id="1" name="Shape 103"/>
+        <p:cNvPr id="1" name="Shape 96"/>
         <p:cNvGrpSpPr/>
         <p:nvPr/>
       </p:nvGrpSpPr>
@@ -10124,7 +10926,7 @@
       </p:grpSpPr>
       <p:sp>
         <p:nvSpPr>
-          <p:cNvPr id="104" name="Google Shape;104;p21"/>
+          <p:cNvPr id="97" name="Google Shape;97;p20"/>
           <p:cNvSpPr txBox="1">
             <a:spLocks noGrp="1"/>
           </p:cNvSpPr>
@@ -10172,35 +10974,81 @@
           </a:p>
         </p:txBody>
       </p:sp>
+      <p:sp>
+        <p:nvSpPr>
+          <p:cNvPr id="98" name="Google Shape;98;p20"/>
+          <p:cNvSpPr txBox="1">
+            <a:spLocks noGrp="1"/>
+          </p:cNvSpPr>
+          <p:nvPr>
+            <p:ph type="body" idx="1"/>
+          </p:nvPr>
+        </p:nvSpPr>
+        <p:spPr>
+          <a:xfrm>
+            <a:off x="311700" y="703049"/>
+            <a:ext cx="8520600" cy="3875825"/>
+          </a:xfrm>
+          <a:prstGeom prst="rect">
+            <a:avLst/>
+          </a:prstGeom>
+        </p:spPr>
+        <p:txBody>
+          <a:bodyPr spcFirstLastPara="1" wrap="square" lIns="91425" tIns="91425" rIns="91425" bIns="91425" anchor="t" anchorCtr="0">
+            <a:normAutofit/>
+          </a:bodyPr>
+          <a:lstStyle/>
+          <a:p>
+            <a:endParaRPr lang="en" dirty="0" smtClean="0"/>
+          </a:p>
+          <a:p>
+            <a:endParaRPr lang="en" dirty="0"/>
+          </a:p>
+          <a:p>
+            <a:pPr marL="457200" lvl="0" indent="-342900" algn="l" rtl="0">
+              <a:spcBef>
+                <a:spcPts val="0"/>
+              </a:spcBef>
+              <a:spcAft>
+                <a:spcPts val="0"/>
+              </a:spcAft>
+              <a:buSzPts val="1800"/>
+              <a:buChar char="●"/>
+            </a:pPr>
+            <a:endParaRPr dirty="0"/>
+          </a:p>
+        </p:txBody>
+      </p:sp>
       <p:pic>
         <p:nvPicPr>
-          <p:cNvPr id="105" name="Google Shape;105;p21"/>
-          <p:cNvPicPr preferRelativeResize="0"/>
+          <p:cNvPr id="2" name="Picture 1"/>
+          <p:cNvPicPr>
+            <a:picLocks noChangeAspect="1"/>
+          </p:cNvPicPr>
           <p:nvPr/>
         </p:nvPicPr>
         <p:blipFill>
-          <a:blip r:embed="rId3">
-            <a:alphaModFix/>
-          </a:blip>
+          <a:blip r:embed="rId3"/>
           <a:stretch>
             <a:fillRect/>
           </a:stretch>
         </p:blipFill>
         <p:spPr>
           <a:xfrm>
-            <a:off x="311700" y="896400"/>
-            <a:ext cx="8679899" cy="4125776"/>
+            <a:off x="632517" y="857304"/>
+            <a:ext cx="7459579" cy="3795431"/>
           </a:xfrm>
           <a:prstGeom prst="rect">
             <a:avLst/>
           </a:prstGeom>
-          <a:noFill/>
-          <a:ln>
-            <a:noFill/>
-          </a:ln>
         </p:spPr>
       </p:pic>
     </p:spTree>
+    <p:extLst>
+      <p:ext uri="{BB962C8B-B14F-4D97-AF65-F5344CB8AC3E}">
+        <p14:creationId xmlns:p14="http://schemas.microsoft.com/office/powerpoint/2010/main" val="3565627441"/>
+      </p:ext>
+    </p:extLst>
   </p:cSld>
   <p:clrMapOvr>
     <a:masterClrMapping/>

</xml_diff>